<commit_message>
FIX: scheme in presentation
</commit_message>
<xml_diff>
--- a/documentation/Presentation/presentation.pptx
+++ b/documentation/Presentation/presentation.pptx
@@ -209,7 +209,7 @@
           <a:p>
             <a:fld id="{D322D285-FB50-4793-AABD-2575DE8C1D5D}" type="datetimeFigureOut">
               <a:rPr lang="ru-RU" smtClean="0"/>
-              <a:t>15.12.2021</a:t>
+              <a:t>16.12.2021</a:t>
             </a:fld>
             <a:endParaRPr lang="ru-RU"/>
           </a:p>
@@ -623,7 +623,7 @@
           <a:p>
             <a:fld id="{2CB17DDD-3B56-4F6F-9842-7AC5DF5A2CEF}" type="datetime1">
               <a:rPr lang="ru-RU" smtClean="0"/>
-              <a:t>15.12.2021</a:t>
+              <a:t>16.12.2021</a:t>
             </a:fld>
             <a:endParaRPr lang="ru-RU"/>
           </a:p>
@@ -821,7 +821,7 @@
           <a:p>
             <a:fld id="{76BE8246-BC4F-40D6-A274-0E589DCF1927}" type="datetime1">
               <a:rPr lang="ru-RU" smtClean="0"/>
-              <a:t>15.12.2021</a:t>
+              <a:t>16.12.2021</a:t>
             </a:fld>
             <a:endParaRPr lang="ru-RU"/>
           </a:p>
@@ -1029,7 +1029,7 @@
           <a:p>
             <a:fld id="{BBB5C6C2-9FE9-4E2E-8DD6-89DA0275FD44}" type="datetime1">
               <a:rPr lang="ru-RU" smtClean="0"/>
-              <a:t>15.12.2021</a:t>
+              <a:t>16.12.2021</a:t>
             </a:fld>
             <a:endParaRPr lang="ru-RU"/>
           </a:p>
@@ -1227,7 +1227,7 @@
           <a:p>
             <a:fld id="{E36328A7-E82E-4EE2-9168-D666DE82EFD6}" type="datetime1">
               <a:rPr lang="ru-RU" smtClean="0"/>
-              <a:t>15.12.2021</a:t>
+              <a:t>16.12.2021</a:t>
             </a:fld>
             <a:endParaRPr lang="ru-RU"/>
           </a:p>
@@ -1502,7 +1502,7 @@
           <a:p>
             <a:fld id="{2E647997-ABF2-4BC1-9871-0491890CE2AD}" type="datetime1">
               <a:rPr lang="ru-RU" smtClean="0"/>
-              <a:t>15.12.2021</a:t>
+              <a:t>16.12.2021</a:t>
             </a:fld>
             <a:endParaRPr lang="ru-RU"/>
           </a:p>
@@ -1767,7 +1767,7 @@
           <a:p>
             <a:fld id="{07A0F077-BCBE-4910-994F-6E7CCA6F3789}" type="datetime1">
               <a:rPr lang="ru-RU" smtClean="0"/>
-              <a:t>15.12.2021</a:t>
+              <a:t>16.12.2021</a:t>
             </a:fld>
             <a:endParaRPr lang="ru-RU"/>
           </a:p>
@@ -2179,7 +2179,7 @@
           <a:p>
             <a:fld id="{2DC91322-7AB8-40A6-BF71-14CA9E824E8E}" type="datetime1">
               <a:rPr lang="ru-RU" smtClean="0"/>
-              <a:t>15.12.2021</a:t>
+              <a:t>16.12.2021</a:t>
             </a:fld>
             <a:endParaRPr lang="ru-RU"/>
           </a:p>
@@ -2320,7 +2320,7 @@
           <a:p>
             <a:fld id="{97C083DF-312B-4271-B91B-E107A59EB49D}" type="datetime1">
               <a:rPr lang="ru-RU" smtClean="0"/>
-              <a:t>15.12.2021</a:t>
+              <a:t>16.12.2021</a:t>
             </a:fld>
             <a:endParaRPr lang="ru-RU"/>
           </a:p>
@@ -2433,7 +2433,7 @@
           <a:p>
             <a:fld id="{3023BD20-5139-4B18-84E4-6360AA14479C}" type="datetime1">
               <a:rPr lang="ru-RU" smtClean="0"/>
-              <a:t>15.12.2021</a:t>
+              <a:t>16.12.2021</a:t>
             </a:fld>
             <a:endParaRPr lang="ru-RU"/>
           </a:p>
@@ -2744,7 +2744,7 @@
           <a:p>
             <a:fld id="{1C6A63DA-E7FA-4BA3-8A6D-FA75CAEA4864}" type="datetime1">
               <a:rPr lang="ru-RU" smtClean="0"/>
-              <a:t>15.12.2021</a:t>
+              <a:t>16.12.2021</a:t>
             </a:fld>
             <a:endParaRPr lang="ru-RU"/>
           </a:p>
@@ -3032,7 +3032,7 @@
           <a:p>
             <a:fld id="{827D114B-3C5E-4146-AD46-58479669C7F9}" type="datetime1">
               <a:rPr lang="ru-RU" smtClean="0"/>
-              <a:t>15.12.2021</a:t>
+              <a:t>16.12.2021</a:t>
             </a:fld>
             <a:endParaRPr lang="ru-RU"/>
           </a:p>
@@ -3273,7 +3273,7 @@
           <a:p>
             <a:fld id="{B36FEB34-0C34-4FF1-BF19-B26582C8F4FD}" type="datetime1">
               <a:rPr lang="ru-RU" smtClean="0"/>
-              <a:t>15.12.2021</a:t>
+              <a:t>16.12.2021</a:t>
             </a:fld>
             <a:endParaRPr lang="ru-RU"/>
           </a:p>
@@ -7192,10 +7192,10 @@
       </p:sp>
       <p:pic>
         <p:nvPicPr>
-          <p:cNvPr id="10" name="Рисунок 9">
-            <a:extLst>
-              <a:ext uri="{FF2B5EF4-FFF2-40B4-BE49-F238E27FC236}">
-                <a16:creationId xmlns:a16="http://schemas.microsoft.com/office/drawing/2014/main" id="{0281AEA8-8111-4313-ADD5-AE026AAB739C}"/>
+          <p:cNvPr id="5" name="Рисунок 4">
+            <a:extLst>
+              <a:ext uri="{FF2B5EF4-FFF2-40B4-BE49-F238E27FC236}">
+                <a16:creationId xmlns:a16="http://schemas.microsoft.com/office/drawing/2014/main" id="{77E05B43-781F-4137-A6E9-CA5745E396B5}"/>
               </a:ext>
             </a:extLst>
           </p:cNvPr>
@@ -7218,8 +7218,8 @@
         </p:blipFill>
         <p:spPr>
           <a:xfrm>
-            <a:off x="838200" y="1325563"/>
-            <a:ext cx="10029734" cy="5030787"/>
+            <a:off x="657308" y="900393"/>
+            <a:ext cx="10877384" cy="5455957"/>
           </a:xfrm>
           <a:prstGeom prst="rect">
             <a:avLst/>

</xml_diff>